<commit_message>
Added new text to presentation file
</commit_message>
<xml_diff>
--- a/UK_House_Prices_Challenge/UK_Housing_Prices_Presentation.pptx
+++ b/UK_House_Prices_Challenge/UK_Housing_Prices_Presentation.pptx
@@ -4355,8 +4355,8 @@
         </p:nvSpPr>
         <p:spPr>
           <a:xfrm>
-            <a:off x="668540" y="4374012"/>
-            <a:ext cx="7806945" cy="369332"/>
+            <a:off x="685371" y="4374012"/>
+            <a:ext cx="7773282" cy="553998"/>
           </a:xfrm>
           <a:prstGeom prst="rect">
             <a:avLst/>
@@ -4375,6 +4375,16 @@
                 <a:cs typeface="Arial" panose="020B0604020202020204" pitchFamily="34" charset="0"/>
               </a:rPr>
               <a:t>Resources Provided by London Datastore: a free, open-source data-sharing portal for London-oriented datasets</a:t>
+            </a:r>
+          </a:p>
+          <a:p>
+            <a:pPr algn="ctr"/>
+            <a:r>
+              <a:rPr lang="en-US" baseline="30000" dirty="0">
+                <a:latin typeface="Arial" panose="020B0604020202020204" pitchFamily="34" charset="0"/>
+                <a:cs typeface="Arial" panose="020B0604020202020204" pitchFamily="34" charset="0"/>
+              </a:rPr>
+              <a:t>Slide template provided by Sacramento State University</a:t>
             </a:r>
             <a:endParaRPr lang="en-US" dirty="0">
               <a:latin typeface="Arial" panose="020B0604020202020204" pitchFamily="34" charset="0"/>

</xml_diff>

<commit_message>
Updated presentative to add from source information
</commit_message>
<xml_diff>
--- a/UK_House_Prices_Challenge/UK_Housing_Prices_Presentation.pptx
+++ b/UK_House_Prices_Challenge/UK_Housing_Prices_Presentation.pptx
@@ -4355,8 +4355,8 @@
         </p:nvSpPr>
         <p:spPr>
           <a:xfrm>
-            <a:off x="685371" y="4374012"/>
-            <a:ext cx="7773282" cy="553998"/>
+            <a:off x="30065" y="4374012"/>
+            <a:ext cx="9083897" cy="830997"/>
           </a:xfrm>
           <a:prstGeom prst="rect">
             <a:avLst/>
@@ -4384,9 +4384,22 @@
                 <a:latin typeface="Arial" panose="020B0604020202020204" pitchFamily="34" charset="0"/>
                 <a:cs typeface="Arial" panose="020B0604020202020204" pitchFamily="34" charset="0"/>
               </a:rPr>
+              <a:t>Code to assist in completing this project provided by Tier 1 Project Platform and websites such as Stack Overflow and statology.org</a:t>
+            </a:r>
+          </a:p>
+          <a:p>
+            <a:pPr algn="ctr"/>
+            <a:r>
+              <a:rPr lang="en-US" baseline="30000" dirty="0">
+                <a:latin typeface="Arial" panose="020B0604020202020204" pitchFamily="34" charset="0"/>
+                <a:cs typeface="Arial" panose="020B0604020202020204" pitchFamily="34" charset="0"/>
+              </a:rPr>
               <a:t>Slide template provided by Sacramento State University</a:t>
             </a:r>
-            <a:endParaRPr lang="en-US" dirty="0">
+          </a:p>
+          <a:p>
+            <a:pPr algn="ctr"/>
+            <a:endParaRPr lang="en-US" baseline="30000" dirty="0">
               <a:latin typeface="Arial" panose="020B0604020202020204" pitchFamily="34" charset="0"/>
               <a:cs typeface="Arial" panose="020B0604020202020204" pitchFamily="34" charset="0"/>
             </a:endParaRPr>

</xml_diff>